<commit_message>
update slides of week12
</commit_message>
<xml_diff>
--- a/week12/Lecture12.pptx
+++ b/week12/Lecture12.pptx
@@ -222,7 +222,7 @@
           <a:p>
             <a:fld id="{634F3F22-B4BB-3F48-9180-464A9F2D66D1}" type="datetimeFigureOut">
               <a:rPr kumimoji="1" lang="zh-CN" altLang="en-US" smtClean="0"/>
-              <a:t>2021/11/30</a:t>
+              <a:t>2023/5/6</a:t>
             </a:fld>
             <a:endParaRPr kumimoji="1" lang="zh-CN" altLang="en-US"/>
           </a:p>
@@ -786,7 +786,7 @@
           <a:p>
             <a:fld id="{FC19A4FA-3D9A-4114-B0D5-759CBD56F1AB}" type="datetimeFigureOut">
               <a:rPr lang="zh-CN" altLang="en-US" smtClean="0"/>
-              <a:t>2021/11/30</a:t>
+              <a:t>2023/5/6</a:t>
             </a:fld>
             <a:endParaRPr lang="zh-CN" altLang="en-US"/>
           </a:p>
@@ -989,7 +989,7 @@
           <a:p>
             <a:fld id="{FC19A4FA-3D9A-4114-B0D5-759CBD56F1AB}" type="datetimeFigureOut">
               <a:rPr lang="zh-CN" altLang="en-US" smtClean="0"/>
-              <a:t>2021/11/30</a:t>
+              <a:t>2023/5/6</a:t>
             </a:fld>
             <a:endParaRPr lang="zh-CN" altLang="en-US"/>
           </a:p>
@@ -1167,7 +1167,7 @@
           <a:p>
             <a:fld id="{FC19A4FA-3D9A-4114-B0D5-759CBD56F1AB}" type="datetimeFigureOut">
               <a:rPr lang="zh-CN" altLang="en-US" smtClean="0"/>
-              <a:t>2021/11/30</a:t>
+              <a:t>2023/5/6</a:t>
             </a:fld>
             <a:endParaRPr lang="zh-CN" altLang="en-US"/>
           </a:p>
@@ -1391,7 +1391,7 @@
           <a:p>
             <a:fld id="{FC19A4FA-3D9A-4114-B0D5-759CBD56F1AB}" type="datetimeFigureOut">
               <a:rPr lang="zh-CN" altLang="en-US" smtClean="0"/>
-              <a:t>2021/11/30</a:t>
+              <a:t>2023/5/6</a:t>
             </a:fld>
             <a:endParaRPr lang="zh-CN" altLang="en-US"/>
           </a:p>
@@ -1625,7 +1625,7 @@
           <a:p>
             <a:fld id="{FC19A4FA-3D9A-4114-B0D5-759CBD56F1AB}" type="datetimeFigureOut">
               <a:rPr lang="zh-CN" altLang="en-US" smtClean="0"/>
-              <a:t>2021/11/30</a:t>
+              <a:t>2023/5/6</a:t>
             </a:fld>
             <a:endParaRPr lang="zh-CN" altLang="en-US"/>
           </a:p>
@@ -2024,7 +2024,7 @@
           <a:p>
             <a:fld id="{FC19A4FA-3D9A-4114-B0D5-759CBD56F1AB}" type="datetimeFigureOut">
               <a:rPr lang="zh-CN" altLang="en-US" smtClean="0"/>
-              <a:t>2021/11/30</a:t>
+              <a:t>2023/5/6</a:t>
             </a:fld>
             <a:endParaRPr lang="zh-CN" altLang="en-US"/>
           </a:p>
@@ -2304,7 +2304,7 @@
           <a:p>
             <a:fld id="{FC19A4FA-3D9A-4114-B0D5-759CBD56F1AB}" type="datetimeFigureOut">
               <a:rPr lang="zh-CN" altLang="en-US" smtClean="0"/>
-              <a:t>2021/11/30</a:t>
+              <a:t>2023/5/6</a:t>
             </a:fld>
             <a:endParaRPr lang="zh-CN" altLang="en-US"/>
           </a:p>
@@ -2456,7 +2456,7 @@
           <a:p>
             <a:fld id="{FC19A4FA-3D9A-4114-B0D5-759CBD56F1AB}" type="datetimeFigureOut">
               <a:rPr lang="zh-CN" altLang="en-US" smtClean="0"/>
-              <a:t>2021/11/30</a:t>
+              <a:t>2023/5/6</a:t>
             </a:fld>
             <a:endParaRPr lang="zh-CN" altLang="en-US"/>
           </a:p>
@@ -2586,7 +2586,7 @@
           <a:p>
             <a:fld id="{FC19A4FA-3D9A-4114-B0D5-759CBD56F1AB}" type="datetimeFigureOut">
               <a:rPr lang="zh-CN" altLang="en-US" smtClean="0"/>
-              <a:t>2021/11/30</a:t>
+              <a:t>2023/5/6</a:t>
             </a:fld>
             <a:endParaRPr lang="zh-CN" altLang="en-US"/>
           </a:p>
@@ -2896,7 +2896,7 @@
           <a:p>
             <a:fld id="{FC19A4FA-3D9A-4114-B0D5-759CBD56F1AB}" type="datetimeFigureOut">
               <a:rPr lang="zh-CN" altLang="en-US" smtClean="0"/>
-              <a:t>2021/11/30</a:t>
+              <a:t>2023/5/6</a:t>
             </a:fld>
             <a:endParaRPr lang="zh-CN" altLang="en-US"/>
           </a:p>
@@ -3183,7 +3183,7 @@
           <a:p>
             <a:fld id="{FC19A4FA-3D9A-4114-B0D5-759CBD56F1AB}" type="datetimeFigureOut">
               <a:rPr lang="zh-CN" altLang="en-US" smtClean="0"/>
-              <a:t>2021/11/30</a:t>
+              <a:t>2023/5/6</a:t>
             </a:fld>
             <a:endParaRPr lang="zh-CN" altLang="en-US"/>
           </a:p>
@@ -3476,7 +3476,7 @@
           <a:p>
             <a:fld id="{FC19A4FA-3D9A-4114-B0D5-759CBD56F1AB}" type="datetimeFigureOut">
               <a:rPr lang="zh-CN" altLang="en-US" smtClean="0"/>
-              <a:t>2021/11/30</a:t>
+              <a:t>2023/5/6</a:t>
             </a:fld>
             <a:endParaRPr lang="zh-CN" altLang="en-US"/>
           </a:p>
@@ -7474,7 +7474,7 @@
           <a:p>
             <a:r>
               <a:rPr kumimoji="1" lang="en-US" altLang="zh-CN" dirty="0"/>
-              <a:t>If a virtual destructor is not virtual, only the destructor of the base class is executed in the follow examples.</a:t>
+              <a:t>If a destructor is not virtual, only the destructor of the base class is executed in the follow examples.</a:t>
             </a:r>
             <a:endParaRPr kumimoji="1" lang="zh-CN" altLang="en-US" dirty="0"/>
           </a:p>

</xml_diff>